<commit_message>
fix figure 1.3 Enc -> Dec
</commit_message>
<xml_diff>
--- a/img/cbc-dec.pptx
+++ b/img/cbc-dec.pptx
@@ -151,7 +151,7 @@
       </p14:sectionLst>
     </p:ext>
     <p:ext uri="{EFAFB233-063F-42B5-8137-9DF3F51BA10A}">
-      <p15:sldGuideLst xmlns="" xmlns:p15="http://schemas.microsoft.com/office/powerpoint/2012/main">
+      <p15:sldGuideLst xmlns:p15="http://schemas.microsoft.com/office/powerpoint/2012/main">
         <p15:guide id="1" orient="horz" pos="2160">
           <p15:clr>
             <a:srgbClr val="A4A3A4"/>
@@ -162,10 +162,20 @@
             <a:srgbClr val="A4A3A4"/>
           </p15:clr>
         </p15:guide>
+        <p15:guide id="3" orient="horz" pos="937">
+          <p15:clr>
+            <a:srgbClr val="A4A3A4"/>
+          </p15:clr>
+        </p15:guide>
+        <p15:guide id="4" pos="1441">
+          <p15:clr>
+            <a:srgbClr val="A4A3A4"/>
+          </p15:clr>
+        </p15:guide>
       </p15:sldGuideLst>
     </p:ext>
     <p:ext uri="{2D200454-40CA-4A62-9FC3-DE9A4176ACB9}">
-      <p15:notesGuideLst xmlns="" xmlns:p15="http://schemas.microsoft.com/office/powerpoint/2012/main">
+      <p15:notesGuideLst xmlns:p15="http://schemas.microsoft.com/office/powerpoint/2012/main">
         <p15:guide id="1" orient="horz" pos="3223">
           <p15:clr>
             <a:srgbClr val="A4A3A4"/>
@@ -2044,7 +2054,7 @@
                           <m:sSubPr>
                             <m:ctrlPr>
                               <a:rPr lang="en-US" altLang="ja-JP" sz="1050" b="0" i="1" smtClean="0">
-                                <a:latin typeface="Cambria Math"/>
+                                <a:latin typeface="Cambria Math" panose="02040503050406030204" pitchFamily="18" charset="0"/>
                                 <a:ea typeface="ＭＳ ゴシック" pitchFamily="49" charset="-128"/>
                                 <a:cs typeface="Courier New" pitchFamily="49" charset="0"/>
                               </a:rPr>
@@ -2169,7 +2179,7 @@
                           <m:sSubPr>
                             <m:ctrlPr>
                               <a:rPr lang="en-US" altLang="ja-JP" sz="1050" b="0" i="1" smtClean="0">
-                                <a:latin typeface="Cambria Math"/>
+                                <a:latin typeface="Cambria Math" panose="02040503050406030204" pitchFamily="18" charset="0"/>
                                 <a:ea typeface="ＭＳ ゴシック" pitchFamily="49" charset="-128"/>
                                 <a:cs typeface="Courier New" pitchFamily="49" charset="0"/>
                               </a:rPr>
@@ -2310,9 +2320,9 @@
                             <a:solidFill>
                               <a:schemeClr val="tx1"/>
                             </a:solidFill>
-                            <a:latin typeface="Cambria Math"/>
+                            <a:latin typeface="Cambria Math" panose="02040503050406030204" pitchFamily="18" charset="0"/>
                           </a:rPr>
-                          <m:t>Enc</m:t>
+                          <m:t>Dec</m:t>
                         </m:r>
                       </m:oMath>
                     </m:oMathPara>
@@ -2343,7 +2353,7 @@
                 <a:prstGeom prst="roundRect">
                   <a:avLst/>
                 </a:prstGeom>
-                <a:blipFill rotWithShape="1">
+                <a:blipFill>
                   <a:blip r:embed="rId5"/>
                   <a:stretch>
                     <a:fillRect/>
@@ -2767,7 +2777,7 @@
                             <m:sSubPr>
                               <m:ctrlPr>
                                 <a:rPr lang="en-US" altLang="ja-JP" sz="1050" b="0" i="1" smtClean="0">
-                                  <a:latin typeface="Cambria Math"/>
+                                  <a:latin typeface="Cambria Math" panose="02040503050406030204" pitchFamily="18" charset="0"/>
                                   <a:ea typeface="ＭＳ ゴシック" pitchFamily="49" charset="-128"/>
                                   <a:cs typeface="Courier New" pitchFamily="49" charset="0"/>
                                 </a:rPr>
@@ -2892,7 +2902,7 @@
                             <m:sSubPr>
                               <m:ctrlPr>
                                 <a:rPr lang="en-US" altLang="ja-JP" sz="1050" b="0" i="1" smtClean="0">
-                                  <a:latin typeface="Cambria Math"/>
+                                  <a:latin typeface="Cambria Math" panose="02040503050406030204" pitchFamily="18" charset="0"/>
                                   <a:ea typeface="ＭＳ ゴシック" pitchFamily="49" charset="-128"/>
                                   <a:cs typeface="Courier New" pitchFamily="49" charset="0"/>
                                 </a:rPr>
@@ -3033,9 +3043,9 @@
                               <a:solidFill>
                                 <a:schemeClr val="tx1"/>
                               </a:solidFill>
-                              <a:latin typeface="Cambria Math"/>
+                              <a:latin typeface="Cambria Math" panose="02040503050406030204" pitchFamily="18" charset="0"/>
                             </a:rPr>
-                            <m:t>Enc</m:t>
+                            <m:t>Dec</m:t>
                           </m:r>
                         </m:oMath>
                       </m:oMathPara>
@@ -3066,8 +3076,8 @@
                   <a:prstGeom prst="roundRect">
                     <a:avLst/>
                   </a:prstGeom>
-                  <a:blipFill rotWithShape="1">
-                    <a:blip r:embed="rId9"/>
+                  <a:blipFill>
+                    <a:blip r:embed="rId5"/>
                     <a:stretch>
                       <a:fillRect/>
                     </a:stretch>
@@ -3491,7 +3501,7 @@
                             <m:sSubPr>
                               <m:ctrlPr>
                                 <a:rPr lang="en-US" altLang="ja-JP" sz="1050" b="0" i="1" smtClean="0">
-                                  <a:latin typeface="Cambria Math"/>
+                                  <a:latin typeface="Cambria Math" panose="02040503050406030204" pitchFamily="18" charset="0"/>
                                   <a:ea typeface="ＭＳ ゴシック" pitchFamily="49" charset="-128"/>
                                   <a:cs typeface="Courier New" pitchFamily="49" charset="0"/>
                                 </a:rPr>
@@ -3616,7 +3626,7 @@
                             <m:sSubPr>
                               <m:ctrlPr>
                                 <a:rPr lang="en-US" altLang="ja-JP" sz="1050" b="0" i="1" smtClean="0">
-                                  <a:latin typeface="Cambria Math"/>
+                                  <a:latin typeface="Cambria Math" panose="02040503050406030204" pitchFamily="18" charset="0"/>
                                   <a:ea typeface="ＭＳ ゴシック" pitchFamily="49" charset="-128"/>
                                   <a:cs typeface="Courier New" pitchFamily="49" charset="0"/>
                                 </a:rPr>
@@ -3757,9 +3767,9 @@
                               <a:solidFill>
                                 <a:schemeClr val="tx1"/>
                               </a:solidFill>
-                              <a:latin typeface="Cambria Math"/>
+                              <a:latin typeface="Cambria Math" panose="02040503050406030204" pitchFamily="18" charset="0"/>
                             </a:rPr>
-                            <m:t>Enc</m:t>
+                            <m:t>Dec</m:t>
                           </m:r>
                         </m:oMath>
                       </m:oMathPara>
@@ -3790,7 +3800,7 @@
                   <a:prstGeom prst="roundRect">
                     <a:avLst/>
                   </a:prstGeom>
-                  <a:blipFill rotWithShape="1">
+                  <a:blipFill>
                     <a:blip r:embed="rId5"/>
                     <a:stretch>
                       <a:fillRect/>
@@ -4035,8 +4045,8 @@
           </p:cxnSp>
         </p:grpSp>
       </p:grpSp>
-      <mc:AlternateContent xmlns:mc="http://schemas.openxmlformats.org/markup-compatibility/2006">
-        <mc:Choice xmlns:a14="http://schemas.microsoft.com/office/drawing/2010/main" Requires="a14">
+      <mc:AlternateContent xmlns:mc="http://schemas.openxmlformats.org/markup-compatibility/2006" xmlns:a14="http://schemas.microsoft.com/office/drawing/2010/main">
+        <mc:Choice Requires="a14">
           <p:sp>
             <p:nvSpPr>
               <p:cNvPr id="36" name="テキスト ボックス 35"/>
@@ -4095,7 +4105,7 @@
             </p:txBody>
           </p:sp>
         </mc:Choice>
-        <mc:Fallback>
+        <mc:Fallback xmlns="">
           <p:sp>
             <p:nvSpPr>
               <p:cNvPr id="36" name="テキスト ボックス 35"/>

</xml_diff>